<commit_message>
predicting red wine presentation slides
</commit_message>
<xml_diff>
--- a/presentation_slides_FC.pptx
+++ b/presentation_slides_FC.pptx
@@ -5,7 +5,7 @@
     <p:sldMasterId id="2147483648" r:id="rId1"/>
   </p:sldMasterIdLst>
   <p:notesMasterIdLst>
-    <p:notesMasterId r:id="rId28"/>
+    <p:notesMasterId r:id="rId29"/>
   </p:notesMasterIdLst>
   <p:sldIdLst>
     <p:sldId id="256" r:id="rId2"/>
@@ -34,38 +34,39 @@
     <p:sldId id="291" r:id="rId25"/>
     <p:sldId id="292" r:id="rId26"/>
     <p:sldId id="274" r:id="rId27"/>
+    <p:sldId id="293" r:id="rId28"/>
   </p:sldIdLst>
   <p:sldSz cx="9144000" cy="5143500" type="screen16x9"/>
   <p:notesSz cx="6858000" cy="9144000"/>
   <p:embeddedFontLst>
     <p:embeddedFont>
       <p:font typeface="Adelle Sans Devanagari Semibold" panose="02000503000000020004" pitchFamily="2" charset="-78"/>
-      <p:regular r:id="rId29"/>
-      <p:bold r:id="rId30"/>
+      <p:regular r:id="rId30"/>
+      <p:bold r:id="rId31"/>
     </p:embeddedFont>
     <p:embeddedFont>
       <p:font typeface="IBM Plex Sans" panose="020B0503050203000203" pitchFamily="34" charset="0"/>
-      <p:regular r:id="rId31"/>
-      <p:bold r:id="rId32"/>
-      <p:italic r:id="rId33"/>
-      <p:boldItalic r:id="rId34"/>
+      <p:regular r:id="rId32"/>
+      <p:bold r:id="rId33"/>
+      <p:italic r:id="rId34"/>
+      <p:boldItalic r:id="rId35"/>
     </p:embeddedFont>
     <p:embeddedFont>
       <p:font typeface="IBM Plex Sans Bold" panose="020B0803050203000203" pitchFamily="34" charset="0"/>
-      <p:regular r:id="rId35"/>
-      <p:bold r:id="rId36"/>
+      <p:regular r:id="rId36"/>
+      <p:bold r:id="rId37"/>
     </p:embeddedFont>
     <p:embeddedFont>
       <p:font typeface="IBM Plex Sans Italics" panose="020B0503050203000203" pitchFamily="34" charset="0"/>
-      <p:regular r:id="rId37"/>
-      <p:italic r:id="rId38"/>
+      <p:regular r:id="rId38"/>
+      <p:italic r:id="rId39"/>
     </p:embeddedFont>
     <p:embeddedFont>
       <p:font typeface="Montserrat" pitchFamily="2" charset="77"/>
-      <p:regular r:id="rId39"/>
-      <p:bold r:id="rId40"/>
-      <p:italic r:id="rId41"/>
-      <p:boldItalic r:id="rId42"/>
+      <p:regular r:id="rId40"/>
+      <p:bold r:id="rId41"/>
+      <p:italic r:id="rId42"/>
+      <p:boldItalic r:id="rId43"/>
     </p:embeddedFont>
   </p:embeddedFontLst>
   <p:defaultTextStyle>
@@ -264,7 +265,7 @@
           <a:p>
             <a:fld id="{41F27FC8-7D04-E744-8ABA-6246907B4847}" type="datetimeFigureOut">
               <a:rPr lang="en-US" smtClean="0"/>
-              <a:t>1/23/25</a:t>
+              <a:t>1/25/25</a:t>
             </a:fld>
             <a:endParaRPr lang="en-US"/>
           </a:p>
@@ -1119,7 +1120,7 @@
             <a:fld id="{1D8BD707-D9CF-40AE-B4C6-C98DA3205C09}" type="datetimeFigureOut">
               <a:rPr lang="en-US" smtClean="0"/>
               <a:pPr/>
-              <a:t>1/23/25</a:t>
+              <a:t>1/25/25</a:t>
             </a:fld>
             <a:endParaRPr lang="en-US"/>
           </a:p>
@@ -1284,7 +1285,7 @@
             <a:fld id="{1D8BD707-D9CF-40AE-B4C6-C98DA3205C09}" type="datetimeFigureOut">
               <a:rPr lang="en-US" smtClean="0"/>
               <a:pPr/>
-              <a:t>1/23/25</a:t>
+              <a:t>1/25/25</a:t>
             </a:fld>
             <a:endParaRPr lang="en-US"/>
           </a:p>
@@ -1459,7 +1460,7 @@
             <a:fld id="{1D8BD707-D9CF-40AE-B4C6-C98DA3205C09}" type="datetimeFigureOut">
               <a:rPr lang="en-US" smtClean="0"/>
               <a:pPr/>
-              <a:t>1/23/25</a:t>
+              <a:t>1/25/25</a:t>
             </a:fld>
             <a:endParaRPr lang="en-US"/>
           </a:p>
@@ -1624,7 +1625,7 @@
             <a:fld id="{1D8BD707-D9CF-40AE-B4C6-C98DA3205C09}" type="datetimeFigureOut">
               <a:rPr lang="en-US" smtClean="0"/>
               <a:pPr/>
-              <a:t>1/23/25</a:t>
+              <a:t>1/25/25</a:t>
             </a:fld>
             <a:endParaRPr lang="en-US"/>
           </a:p>
@@ -1866,7 +1867,7 @@
             <a:fld id="{1D8BD707-D9CF-40AE-B4C6-C98DA3205C09}" type="datetimeFigureOut">
               <a:rPr lang="en-US" smtClean="0"/>
               <a:pPr/>
-              <a:t>1/23/25</a:t>
+              <a:t>1/25/25</a:t>
             </a:fld>
             <a:endParaRPr lang="en-US"/>
           </a:p>
@@ -2148,7 +2149,7 @@
             <a:fld id="{1D8BD707-D9CF-40AE-B4C6-C98DA3205C09}" type="datetimeFigureOut">
               <a:rPr lang="en-US" smtClean="0"/>
               <a:pPr/>
-              <a:t>1/23/25</a:t>
+              <a:t>1/25/25</a:t>
             </a:fld>
             <a:endParaRPr lang="en-US"/>
           </a:p>
@@ -2564,7 +2565,7 @@
             <a:fld id="{1D8BD707-D9CF-40AE-B4C6-C98DA3205C09}" type="datetimeFigureOut">
               <a:rPr lang="en-US" smtClean="0"/>
               <a:pPr/>
-              <a:t>1/23/25</a:t>
+              <a:t>1/25/25</a:t>
             </a:fld>
             <a:endParaRPr lang="en-US"/>
           </a:p>
@@ -2678,7 +2679,7 @@
             <a:fld id="{1D8BD707-D9CF-40AE-B4C6-C98DA3205C09}" type="datetimeFigureOut">
               <a:rPr lang="en-US" smtClean="0"/>
               <a:pPr/>
-              <a:t>1/23/25</a:t>
+              <a:t>1/25/25</a:t>
             </a:fld>
             <a:endParaRPr lang="en-US"/>
           </a:p>
@@ -2770,7 +2771,7 @@
             <a:fld id="{1D8BD707-D9CF-40AE-B4C6-C98DA3205C09}" type="datetimeFigureOut">
               <a:rPr lang="en-US" smtClean="0"/>
               <a:pPr/>
-              <a:t>1/23/25</a:t>
+              <a:t>1/25/25</a:t>
             </a:fld>
             <a:endParaRPr lang="en-US"/>
           </a:p>
@@ -3042,7 +3043,7 @@
             <a:fld id="{1D8BD707-D9CF-40AE-B4C6-C98DA3205C09}" type="datetimeFigureOut">
               <a:rPr lang="en-US" smtClean="0"/>
               <a:pPr/>
-              <a:t>1/23/25</a:t>
+              <a:t>1/25/25</a:t>
             </a:fld>
             <a:endParaRPr lang="en-US"/>
           </a:p>
@@ -3291,7 +3292,7 @@
             <a:fld id="{1D8BD707-D9CF-40AE-B4C6-C98DA3205C09}" type="datetimeFigureOut">
               <a:rPr lang="en-US" smtClean="0"/>
               <a:pPr/>
-              <a:t>1/23/25</a:t>
+              <a:t>1/25/25</a:t>
             </a:fld>
             <a:endParaRPr lang="en-US"/>
           </a:p>
@@ -3499,7 +3500,7 @@
             <a:fld id="{1D8BD707-D9CF-40AE-B4C6-C98DA3205C09}" type="datetimeFigureOut">
               <a:rPr lang="en-US" smtClean="0"/>
               <a:pPr/>
-              <a:t>1/23/25</a:t>
+              <a:t>1/25/25</a:t>
             </a:fld>
             <a:endParaRPr lang="en-US"/>
           </a:p>
@@ -8050,10 +8051,10 @@
       </p:sp>
       <p:pic>
         <p:nvPicPr>
-          <p:cNvPr id="7" name="Picture 6">
+          <p:cNvPr id="9" name="Picture 8">
             <a:extLst>
               <a:ext uri="{FF2B5EF4-FFF2-40B4-BE49-F238E27FC236}">
-                <a16:creationId xmlns:a16="http://schemas.microsoft.com/office/drawing/2014/main" id="{1C8EFA52-A0D5-B3E7-1E92-C41F4D4B908B}"/>
+                <a16:creationId xmlns:a16="http://schemas.microsoft.com/office/drawing/2014/main" id="{59613B98-05C1-F70D-44E9-FA316DB52E1F}"/>
               </a:ext>
             </a:extLst>
           </p:cNvPr>
@@ -8070,8 +8071,8 @@
         </p:blipFill>
         <p:spPr>
           <a:xfrm>
-            <a:off x="2371108" y="-19050"/>
-            <a:ext cx="5525720" cy="5143500"/>
+            <a:off x="2666474" y="0"/>
+            <a:ext cx="6852844" cy="5143500"/>
           </a:xfrm>
           <a:prstGeom prst="rect">
             <a:avLst/>
@@ -9467,10 +9468,10 @@
       </p:sp>
       <p:pic>
         <p:nvPicPr>
-          <p:cNvPr id="5" name="Picture 4">
+          <p:cNvPr id="7" name="Picture 6">
             <a:extLst>
               <a:ext uri="{FF2B5EF4-FFF2-40B4-BE49-F238E27FC236}">
-                <a16:creationId xmlns:a16="http://schemas.microsoft.com/office/drawing/2014/main" id="{C89881B3-54DD-A7BC-A4BB-793FE5C8F2D7}"/>
+                <a16:creationId xmlns:a16="http://schemas.microsoft.com/office/drawing/2014/main" id="{BAF5AC06-EC4A-A7EF-B6E4-4865753C38D5}"/>
               </a:ext>
             </a:extLst>
           </p:cNvPr>
@@ -9487,8 +9488,8 @@
         </p:blipFill>
         <p:spPr>
           <a:xfrm>
-            <a:off x="2144474" y="0"/>
-            <a:ext cx="4855051" cy="5143500"/>
+            <a:off x="2337208" y="666750"/>
+            <a:ext cx="6234103" cy="4218365"/>
           </a:xfrm>
           <a:prstGeom prst="rect">
             <a:avLst/>
@@ -10884,10 +10885,10 @@
       </p:sp>
       <p:pic>
         <p:nvPicPr>
-          <p:cNvPr id="7" name="Picture 6">
+          <p:cNvPr id="5" name="Picture 4">
             <a:extLst>
               <a:ext uri="{FF2B5EF4-FFF2-40B4-BE49-F238E27FC236}">
-                <a16:creationId xmlns:a16="http://schemas.microsoft.com/office/drawing/2014/main" id="{CD1D895C-2414-3686-3133-7EBF1C7AB0E9}"/>
+                <a16:creationId xmlns:a16="http://schemas.microsoft.com/office/drawing/2014/main" id="{8A17456B-AB05-F7C3-6136-8C614650DE20}"/>
               </a:ext>
             </a:extLst>
           </p:cNvPr>
@@ -10904,8 +10905,8 @@
         </p:blipFill>
         <p:spPr>
           <a:xfrm>
-            <a:off x="990600" y="266700"/>
-            <a:ext cx="7134092" cy="4876800"/>
+            <a:off x="1950351" y="636032"/>
+            <a:ext cx="6104709" cy="4507468"/>
           </a:xfrm>
           <a:prstGeom prst="rect">
             <a:avLst/>
@@ -11545,10 +11546,10 @@
       </p:sp>
       <p:pic>
         <p:nvPicPr>
-          <p:cNvPr id="6" name="Picture 5">
+          <p:cNvPr id="10" name="Picture 9">
             <a:extLst>
               <a:ext uri="{FF2B5EF4-FFF2-40B4-BE49-F238E27FC236}">
-                <a16:creationId xmlns:a16="http://schemas.microsoft.com/office/drawing/2014/main" id="{C27DE600-B18A-173E-9ABB-C7886FD120F7}"/>
+                <a16:creationId xmlns:a16="http://schemas.microsoft.com/office/drawing/2014/main" id="{7B56815F-20B0-6A5B-A5E2-63FF5ED7635D}"/>
               </a:ext>
             </a:extLst>
           </p:cNvPr>
@@ -11565,68 +11566,8 @@
         </p:blipFill>
         <p:spPr>
           <a:xfrm>
-            <a:off x="-786" y="1003059"/>
-            <a:ext cx="7772400" cy="714220"/>
-          </a:xfrm>
-          <a:prstGeom prst="rect">
-            <a:avLst/>
-          </a:prstGeom>
-        </p:spPr>
-      </p:pic>
-      <p:pic>
-        <p:nvPicPr>
-          <p:cNvPr id="8" name="Picture 7">
-            <a:extLst>
-              <a:ext uri="{FF2B5EF4-FFF2-40B4-BE49-F238E27FC236}">
-                <a16:creationId xmlns:a16="http://schemas.microsoft.com/office/drawing/2014/main" id="{2599F840-8EF5-FB43-DF0B-0EE846824B5A}"/>
-              </a:ext>
-            </a:extLst>
-          </p:cNvPr>
-          <p:cNvPicPr>
-            <a:picLocks noChangeAspect="1"/>
-          </p:cNvPicPr>
-          <p:nvPr/>
-        </p:nvPicPr>
-        <p:blipFill>
-          <a:blip r:embed="rId10"/>
-          <a:stretch>
-            <a:fillRect/>
-          </a:stretch>
-        </p:blipFill>
-        <p:spPr>
-          <a:xfrm>
-            <a:off x="-786" y="2131559"/>
-            <a:ext cx="7772400" cy="2589326"/>
-          </a:xfrm>
-          <a:prstGeom prst="rect">
-            <a:avLst/>
-          </a:prstGeom>
-        </p:spPr>
-      </p:pic>
-      <p:pic>
-        <p:nvPicPr>
-          <p:cNvPr id="12" name="Picture 11">
-            <a:extLst>
-              <a:ext uri="{FF2B5EF4-FFF2-40B4-BE49-F238E27FC236}">
-                <a16:creationId xmlns:a16="http://schemas.microsoft.com/office/drawing/2014/main" id="{A258B013-0E51-B06C-D7EA-C41394F87D7C}"/>
-              </a:ext>
-            </a:extLst>
-          </p:cNvPr>
-          <p:cNvPicPr>
-            <a:picLocks noChangeAspect="1"/>
-          </p:cNvPicPr>
-          <p:nvPr/>
-        </p:nvPicPr>
-        <p:blipFill>
-          <a:blip r:embed="rId11"/>
-          <a:stretch>
-            <a:fillRect/>
-          </a:stretch>
-        </p:blipFill>
-        <p:spPr>
-          <a:xfrm>
-            <a:off x="3124200" y="3047955"/>
-            <a:ext cx="5113286" cy="2073672"/>
+            <a:off x="228600" y="1270216"/>
+            <a:ext cx="7772400" cy="2261640"/>
           </a:xfrm>
           <a:prstGeom prst="rect">
             <a:avLst/>
@@ -11956,10 +11897,10 @@
       </p:sp>
       <p:pic>
         <p:nvPicPr>
-          <p:cNvPr id="9" name="Picture 8">
+          <p:cNvPr id="6" name="Picture 5">
             <a:extLst>
               <a:ext uri="{FF2B5EF4-FFF2-40B4-BE49-F238E27FC236}">
-                <a16:creationId xmlns:a16="http://schemas.microsoft.com/office/drawing/2014/main" id="{5366C41A-AE0A-F480-D9A7-0C3105ECD4A2}"/>
+                <a16:creationId xmlns:a16="http://schemas.microsoft.com/office/drawing/2014/main" id="{A9213237-2BF2-6807-F12E-E10CCA362CA3}"/>
               </a:ext>
             </a:extLst>
           </p:cNvPr>
@@ -11976,8 +11917,8 @@
         </p:blipFill>
         <p:spPr>
           <a:xfrm>
-            <a:off x="0" y="860650"/>
-            <a:ext cx="8153400" cy="4236978"/>
+            <a:off x="304800" y="849192"/>
+            <a:ext cx="7515776" cy="4214956"/>
           </a:xfrm>
           <a:prstGeom prst="rect">
             <a:avLst/>
@@ -14377,7 +14318,7 @@
         <p:spPr>
           <a:xfrm>
             <a:off x="19836" y="1276350"/>
-            <a:ext cx="9144000" cy="3139321"/>
+            <a:ext cx="9144000" cy="3872855"/>
           </a:xfrm>
           <a:prstGeom prst="rect">
             <a:avLst/>
@@ -14551,13 +14492,17 @@
             </a:r>
           </a:p>
           <a:p>
+            <a:pPr marL="762" marR="542976" indent="11113" rtl="0">
+              <a:spcBef>
+                <a:spcPts val="1396"/>
+              </a:spcBef>
+            </a:pPr>
             <a:r>
               <a:rPr lang="en-US" sz="1200" dirty="0">
                 <a:solidFill>
                   <a:srgbClr val="000000"/>
                 </a:solidFill>
                 <a:effectLst/>
-                <a:latin typeface="Times New Roman" panose="02020603050405020304" pitchFamily="18" charset="0"/>
               </a:rPr>
               <a:t>performed hyperparameter tuning via </a:t>
             </a:r>
@@ -14567,7 +14512,6 @@
                   <a:srgbClr val="000000"/>
                 </a:solidFill>
                 <a:effectLst/>
-                <a:latin typeface="Times New Roman" panose="02020603050405020304" pitchFamily="18" charset="0"/>
               </a:rPr>
               <a:t>GridSearchCV</a:t>
             </a:r>
@@ -14577,10 +14521,33 @@
                   <a:srgbClr val="000000"/>
                 </a:solidFill>
                 <a:effectLst/>
-                <a:latin typeface="Times New Roman" panose="02020603050405020304" pitchFamily="18" charset="0"/>
-              </a:rPr>
-              <a:t> to improve the result of our model.</a:t>
-            </a:r>
+              </a:rPr>
+              <a:t> to improve the result of our model. </a:t>
+            </a:r>
+            <a:r>
+              <a:rPr lang="en-US" sz="1200" b="0" i="0" u="none" strike="noStrike" dirty="0">
+                <a:solidFill>
+                  <a:srgbClr val="000000"/>
+                </a:solidFill>
+                <a:effectLst/>
+              </a:rPr>
+              <a:t>In addition, we adjusted the threshold to achieve a higher F1 score.</a:t>
+            </a:r>
+            <a:endParaRPr lang="en-US" sz="1200" b="0" dirty="0">
+              <a:effectLst/>
+            </a:endParaRPr>
+          </a:p>
+          <a:p>
+            <a:br>
+              <a:rPr lang="en-US" sz="1200" dirty="0"/>
+            </a:br>
+            <a:endParaRPr lang="en-US" sz="1200" dirty="0">
+              <a:solidFill>
+                <a:srgbClr val="000000"/>
+              </a:solidFill>
+              <a:effectLst/>
+              <a:latin typeface="Times New Roman" panose="02020603050405020304" pitchFamily="18" charset="0"/>
+            </a:endParaRPr>
           </a:p>
           <a:p>
             <a:endParaRPr lang="en-US" dirty="0">
@@ -17288,6 +17255,564 @@
 </p:sld>
 </file>
 
+<file path=ppt/slides/slide27.xml><?xml version="1.0" encoding="utf-8"?>
+<p:sld xmlns:a="http://schemas.openxmlformats.org/drawingml/2006/main" xmlns:r="http://schemas.openxmlformats.org/officeDocument/2006/relationships" xmlns:p="http://schemas.openxmlformats.org/presentationml/2006/main">
+  <p:cSld>
+    <p:spTree>
+      <p:nvGrpSpPr>
+        <p:cNvPr id="1" name="">
+          <a:extLst>
+            <a:ext uri="{FF2B5EF4-FFF2-40B4-BE49-F238E27FC236}">
+              <a16:creationId xmlns:a16="http://schemas.microsoft.com/office/drawing/2014/main" id="{4C07AD59-C9EA-2F65-C535-B63C50142F1F}"/>
+            </a:ext>
+          </a:extLst>
+        </p:cNvPr>
+        <p:cNvGrpSpPr/>
+        <p:nvPr/>
+      </p:nvGrpSpPr>
+      <p:grpSpPr>
+        <a:xfrm>
+          <a:off x="0" y="0"/>
+          <a:ext cx="0" cy="0"/>
+          <a:chOff x="0" y="0"/>
+          <a:chExt cx="0" cy="0"/>
+        </a:xfrm>
+      </p:grpSpPr>
+      <p:sp>
+        <p:nvSpPr>
+          <p:cNvPr id="2" name="Freeform 2">
+            <a:extLst>
+              <a:ext uri="{FF2B5EF4-FFF2-40B4-BE49-F238E27FC236}">
+                <a16:creationId xmlns:a16="http://schemas.microsoft.com/office/drawing/2014/main" id="{EC33410E-E236-326F-C2C8-B00F5F8E483A}"/>
+              </a:ext>
+            </a:extLst>
+          </p:cNvPr>
+          <p:cNvSpPr/>
+          <p:nvPr/>
+        </p:nvSpPr>
+        <p:spPr>
+          <a:xfrm>
+            <a:off x="0" y="0"/>
+            <a:ext cx="9144000" cy="5143500"/>
+          </a:xfrm>
+          <a:custGeom>
+            <a:avLst/>
+            <a:gdLst/>
+            <a:ahLst/>
+            <a:cxnLst/>
+            <a:rect l="l" t="t" r="r" b="b"/>
+            <a:pathLst>
+              <a:path w="9144000" h="5143500">
+                <a:moveTo>
+                  <a:pt x="0" y="0"/>
+                </a:moveTo>
+                <a:lnTo>
+                  <a:pt x="9144000" y="0"/>
+                </a:lnTo>
+                <a:lnTo>
+                  <a:pt x="9144000" y="5143500"/>
+                </a:lnTo>
+                <a:lnTo>
+                  <a:pt x="0" y="5143500"/>
+                </a:lnTo>
+                <a:lnTo>
+                  <a:pt x="0" y="0"/>
+                </a:lnTo>
+                <a:close/>
+              </a:path>
+            </a:pathLst>
+          </a:custGeom>
+          <a:blipFill>
+            <a:blip r:embed="rId2">
+              <a:extLst>
+                <a:ext uri="{96DAC541-7B7A-43D3-8B79-37D633B846F1}">
+                  <asvg:svgBlip xmlns:asvg="http://schemas.microsoft.com/office/drawing/2016/SVG/main" r:embed="rId3"/>
+                </a:ext>
+              </a:extLst>
+            </a:blip>
+            <a:stretch>
+              <a:fillRect/>
+            </a:stretch>
+          </a:blipFill>
+        </p:spPr>
+      </p:sp>
+      <p:sp>
+        <p:nvSpPr>
+          <p:cNvPr id="3" name="Freeform 3">
+            <a:extLst>
+              <a:ext uri="{FF2B5EF4-FFF2-40B4-BE49-F238E27FC236}">
+                <a16:creationId xmlns:a16="http://schemas.microsoft.com/office/drawing/2014/main" id="{436306EB-F2E6-79ED-C9CB-959E0165163C}"/>
+              </a:ext>
+            </a:extLst>
+          </p:cNvPr>
+          <p:cNvSpPr/>
+          <p:nvPr/>
+        </p:nvSpPr>
+        <p:spPr>
+          <a:xfrm>
+            <a:off x="0" y="0"/>
+            <a:ext cx="9144000" cy="5143500"/>
+          </a:xfrm>
+          <a:custGeom>
+            <a:avLst/>
+            <a:gdLst/>
+            <a:ahLst/>
+            <a:cxnLst/>
+            <a:rect l="l" t="t" r="r" b="b"/>
+            <a:pathLst>
+              <a:path w="9144000" h="5143500">
+                <a:moveTo>
+                  <a:pt x="0" y="0"/>
+                </a:moveTo>
+                <a:lnTo>
+                  <a:pt x="9144000" y="0"/>
+                </a:lnTo>
+                <a:lnTo>
+                  <a:pt x="9144000" y="5143500"/>
+                </a:lnTo>
+                <a:lnTo>
+                  <a:pt x="0" y="5143500"/>
+                </a:lnTo>
+                <a:lnTo>
+                  <a:pt x="0" y="0"/>
+                </a:lnTo>
+                <a:close/>
+              </a:path>
+            </a:pathLst>
+          </a:custGeom>
+          <a:blipFill>
+            <a:blip r:embed="rId4"/>
+            <a:stretch>
+              <a:fillRect/>
+            </a:stretch>
+          </a:blipFill>
+        </p:spPr>
+      </p:sp>
+      <p:sp>
+        <p:nvSpPr>
+          <p:cNvPr id="4" name="Freeform 4">
+            <a:extLst>
+              <a:ext uri="{FF2B5EF4-FFF2-40B4-BE49-F238E27FC236}">
+                <a16:creationId xmlns:a16="http://schemas.microsoft.com/office/drawing/2014/main" id="{8FF1D648-9B00-B6DA-75B7-86A1DC7C3474}"/>
+              </a:ext>
+            </a:extLst>
+          </p:cNvPr>
+          <p:cNvSpPr/>
+          <p:nvPr/>
+        </p:nvSpPr>
+        <p:spPr>
+          <a:xfrm>
+            <a:off x="0" y="12583"/>
+            <a:ext cx="9144000" cy="802196"/>
+          </a:xfrm>
+          <a:custGeom>
+            <a:avLst/>
+            <a:gdLst/>
+            <a:ahLst/>
+            <a:cxnLst/>
+            <a:rect l="l" t="t" r="r" b="b"/>
+            <a:pathLst>
+              <a:path w="9144000" h="802196">
+                <a:moveTo>
+                  <a:pt x="0" y="0"/>
+                </a:moveTo>
+                <a:lnTo>
+                  <a:pt x="9144000" y="0"/>
+                </a:lnTo>
+                <a:lnTo>
+                  <a:pt x="9144000" y="802195"/>
+                </a:lnTo>
+                <a:lnTo>
+                  <a:pt x="0" y="802195"/>
+                </a:lnTo>
+                <a:lnTo>
+                  <a:pt x="0" y="0"/>
+                </a:lnTo>
+                <a:close/>
+              </a:path>
+            </a:pathLst>
+          </a:custGeom>
+          <a:blipFill>
+            <a:blip r:embed="rId5">
+              <a:extLst>
+                <a:ext uri="{96DAC541-7B7A-43D3-8B79-37D633B846F1}">
+                  <asvg:svgBlip xmlns:asvg="http://schemas.microsoft.com/office/drawing/2016/SVG/main" r:embed="rId6"/>
+                </a:ext>
+              </a:extLst>
+            </a:blip>
+            <a:stretch>
+              <a:fillRect/>
+            </a:stretch>
+          </a:blipFill>
+        </p:spPr>
+      </p:sp>
+      <p:sp>
+        <p:nvSpPr>
+          <p:cNvPr id="5" name="Freeform 5">
+            <a:extLst>
+              <a:ext uri="{FF2B5EF4-FFF2-40B4-BE49-F238E27FC236}">
+                <a16:creationId xmlns:a16="http://schemas.microsoft.com/office/drawing/2014/main" id="{11FAE027-2C5B-2CC2-2600-07ABDF70859D}"/>
+              </a:ext>
+            </a:extLst>
+          </p:cNvPr>
+          <p:cNvSpPr/>
+          <p:nvPr/>
+        </p:nvSpPr>
+        <p:spPr>
+          <a:xfrm>
+            <a:off x="361740" y="1701975"/>
+            <a:ext cx="8229600" cy="2700299"/>
+          </a:xfrm>
+          <a:custGeom>
+            <a:avLst/>
+            <a:gdLst/>
+            <a:ahLst/>
+            <a:cxnLst/>
+            <a:rect l="l" t="t" r="r" b="b"/>
+            <a:pathLst>
+              <a:path w="8229600" h="2700299">
+                <a:moveTo>
+                  <a:pt x="0" y="0"/>
+                </a:moveTo>
+                <a:lnTo>
+                  <a:pt x="8229600" y="0"/>
+                </a:lnTo>
+                <a:lnTo>
+                  <a:pt x="8229600" y="2700299"/>
+                </a:lnTo>
+                <a:lnTo>
+                  <a:pt x="0" y="2700299"/>
+                </a:lnTo>
+                <a:lnTo>
+                  <a:pt x="0" y="0"/>
+                </a:lnTo>
+                <a:close/>
+              </a:path>
+            </a:pathLst>
+          </a:custGeom>
+          <a:blipFill>
+            <a:blip r:embed="rId7">
+              <a:extLst>
+                <a:ext uri="{96DAC541-7B7A-43D3-8B79-37D633B846F1}">
+                  <asvg:svgBlip xmlns:asvg="http://schemas.microsoft.com/office/drawing/2016/SVG/main" r:embed="rId8"/>
+                </a:ext>
+              </a:extLst>
+            </a:blip>
+            <a:stretch>
+              <a:fillRect/>
+            </a:stretch>
+          </a:blipFill>
+        </p:spPr>
+      </p:sp>
+      <p:sp>
+        <p:nvSpPr>
+          <p:cNvPr id="7" name="TextBox 7">
+            <a:extLst>
+              <a:ext uri="{FF2B5EF4-FFF2-40B4-BE49-F238E27FC236}">
+                <a16:creationId xmlns:a16="http://schemas.microsoft.com/office/drawing/2014/main" id="{8314A404-0B1D-F56B-6D7B-6E242D99F3D9}"/>
+              </a:ext>
+            </a:extLst>
+          </p:cNvPr>
+          <p:cNvSpPr txBox="1"/>
+          <p:nvPr/>
+        </p:nvSpPr>
+        <p:spPr>
+          <a:xfrm>
+            <a:off x="85724" y="1003469"/>
+            <a:ext cx="8905875" cy="4093044"/>
+          </a:xfrm>
+          <a:prstGeom prst="rect">
+            <a:avLst/>
+          </a:prstGeom>
+        </p:spPr>
+        <p:txBody>
+          <a:bodyPr wrap="square" lIns="0" tIns="0" rIns="0" bIns="0" rtlCol="0" anchor="t">
+            <a:spAutoFit/>
+          </a:bodyPr>
+          <a:lstStyle/>
+          <a:p>
+            <a:r>
+              <a:rPr lang="en-US" sz="1400" b="0" i="0" dirty="0">
+                <a:solidFill>
+                  <a:srgbClr val="001D35"/>
+                </a:solidFill>
+                <a:effectLst/>
+                <a:latin typeface="Google Sans"/>
+              </a:rPr>
+              <a:t>When assessing wine quality, precision is generally considered more important than recall because it's crucial to accurately identify high-quality wines, meaning a false positive (classifying a low-quality wine as high quality) is more detrimental than a false negative (missing a truly high-quality wine) in most scenarios. </a:t>
+            </a:r>
+            <a:endParaRPr lang="en-US" sz="1400" b="0" i="0" dirty="0">
+              <a:solidFill>
+                <a:srgbClr val="000000"/>
+              </a:solidFill>
+              <a:latin typeface="Helvetica" pitchFamily="2" charset="0"/>
+            </a:endParaRPr>
+          </a:p>
+          <a:p>
+            <a:r>
+              <a:rPr lang="en-US" sz="1400" spc="-16" dirty="0">
+                <a:solidFill>
+                  <a:srgbClr val="000000"/>
+                </a:solidFill>
+                <a:effectLst/>
+                <a:latin typeface="Helvetica" pitchFamily="2" charset="0"/>
+                <a:sym typeface="IBM Plex Sans"/>
+              </a:rPr>
+              <a:t>Impact of False Positives: </a:t>
+            </a:r>
+            <a:r>
+              <a:rPr lang="en-US" sz="1400" b="0" i="0" dirty="0">
+                <a:solidFill>
+                  <a:srgbClr val="545D7E"/>
+                </a:solidFill>
+                <a:effectLst/>
+                <a:latin typeface="Google Sans"/>
+              </a:rPr>
+              <a:t>If a model incorrectly labels a low-quality wine as high quality, it could mislead consumers and damage the reputation of a producer, which is a more significant concern than missing a few good wines. </a:t>
+            </a:r>
+          </a:p>
+          <a:p>
+            <a:r>
+              <a:rPr lang="en-US" sz="1400" spc="-16" dirty="0">
+                <a:solidFill>
+                  <a:srgbClr val="545D7E"/>
+                </a:solidFill>
+                <a:latin typeface="Google Sans"/>
+                <a:sym typeface="IBM Plex Sans"/>
+              </a:rPr>
+              <a:t>Focus on Quality Assurance: </a:t>
+            </a:r>
+            <a:r>
+              <a:rPr lang="en-US" sz="1400" b="0" i="0" dirty="0">
+                <a:solidFill>
+                  <a:srgbClr val="545D7E"/>
+                </a:solidFill>
+                <a:effectLst/>
+                <a:latin typeface="Google Sans"/>
+              </a:rPr>
+              <a:t>Wine quality assessment aims to ensure that the wines being marketed as high quality truly meet the standard, so prioritizing precision aligns with this goal. </a:t>
+            </a:r>
+          </a:p>
+          <a:p>
+            <a:r>
+              <a:rPr lang="en-US" sz="1400" spc="-16" dirty="0">
+                <a:solidFill>
+                  <a:srgbClr val="545D7E"/>
+                </a:solidFill>
+                <a:latin typeface="Google Sans"/>
+                <a:sym typeface="IBM Plex Sans"/>
+              </a:rPr>
+              <a:t>However, context matters:</a:t>
+            </a:r>
+          </a:p>
+          <a:p>
+            <a:pPr marL="285750" indent="-285750">
+              <a:buFontTx/>
+              <a:buChar char="-"/>
+            </a:pPr>
+            <a:r>
+              <a:rPr lang="en-US" sz="1400" spc="-16" dirty="0">
+                <a:solidFill>
+                  <a:srgbClr val="545D7E"/>
+                </a:solidFill>
+                <a:effectLst/>
+                <a:latin typeface="Google Sans"/>
+                <a:sym typeface="IBM Plex Sans"/>
+              </a:rPr>
+              <a:t>Market Analys</a:t>
+            </a:r>
+            <a:r>
+              <a:rPr lang="en-US" sz="1400" spc="-16" dirty="0">
+                <a:solidFill>
+                  <a:srgbClr val="545D7E"/>
+                </a:solidFill>
+                <a:latin typeface="Google Sans"/>
+                <a:sym typeface="IBM Plex Sans"/>
+              </a:rPr>
+              <a:t>is : </a:t>
+            </a:r>
+            <a:r>
+              <a:rPr lang="en-US" sz="1400" b="0" i="0" dirty="0">
+                <a:solidFill>
+                  <a:srgbClr val="001D35"/>
+                </a:solidFill>
+                <a:effectLst/>
+                <a:latin typeface="Google Sans"/>
+              </a:rPr>
+              <a:t> If the goal is to identify all potential high-quality wines in a large market, even at the cost of including some lower-quality options, then recall might be more important. </a:t>
+            </a:r>
+          </a:p>
+          <a:p>
+            <a:pPr marL="285750" indent="-285750">
+              <a:buFontTx/>
+              <a:buChar char="-"/>
+            </a:pPr>
+            <a:r>
+              <a:rPr lang="en-US" sz="1400" spc="-16" dirty="0">
+                <a:solidFill>
+                  <a:srgbClr val="001D35"/>
+                </a:solidFill>
+                <a:latin typeface="Google Sans"/>
+                <a:sym typeface="IBM Plex Sans"/>
+              </a:rPr>
+              <a:t>Specific Quality Levels:  </a:t>
+            </a:r>
+            <a:r>
+              <a:rPr lang="en-US" sz="1400" b="0" i="0" dirty="0">
+                <a:solidFill>
+                  <a:srgbClr val="001D35"/>
+                </a:solidFill>
+                <a:effectLst/>
+                <a:latin typeface="Google Sans"/>
+              </a:rPr>
+              <a:t>Depending on the quality tier, the importance of precision might vary. </a:t>
+            </a:r>
+          </a:p>
+          <a:p>
+            <a:endParaRPr lang="en-US" sz="1400" b="0" i="0">
+              <a:solidFill>
+                <a:srgbClr val="001D35"/>
+              </a:solidFill>
+              <a:effectLst/>
+              <a:latin typeface="Google Sans"/>
+            </a:endParaRPr>
+          </a:p>
+          <a:p>
+            <a:r>
+              <a:rPr lang="en-US" sz="1400" b="0" i="0">
+                <a:solidFill>
+                  <a:srgbClr val="001D35"/>
+                </a:solidFill>
+                <a:effectLst/>
+                <a:latin typeface="Google Sans"/>
+              </a:rPr>
+              <a:t>Key Takeaway:  For most wine quality assessments, prioritizing precision is generally considered better practice as it minimizes the risk of misrepresenting lower-quality wines as high quality. </a:t>
+            </a:r>
+            <a:endParaRPr lang="en-US" sz="1400" b="0" i="0" dirty="0">
+              <a:solidFill>
+                <a:srgbClr val="001D35"/>
+              </a:solidFill>
+              <a:effectLst/>
+              <a:latin typeface="Google Sans"/>
+            </a:endParaRPr>
+          </a:p>
+          <a:p>
+            <a:pPr marL="285750" indent="-285750">
+              <a:buFontTx/>
+              <a:buChar char="-"/>
+            </a:pPr>
+            <a:endParaRPr lang="en-US" sz="1400" spc="-16" dirty="0">
+              <a:solidFill>
+                <a:srgbClr val="001D35"/>
+              </a:solidFill>
+              <a:latin typeface="Google Sans"/>
+              <a:sym typeface="IBM Plex Sans"/>
+            </a:endParaRPr>
+          </a:p>
+          <a:p>
+            <a:pPr marL="285750" indent="-285750">
+              <a:buFontTx/>
+              <a:buChar char="-"/>
+            </a:pPr>
+            <a:endParaRPr lang="en-US" sz="1399" spc="-16" dirty="0">
+              <a:solidFill>
+                <a:srgbClr val="3F3F3F"/>
+              </a:solidFill>
+              <a:effectLst/>
+              <a:latin typeface="IBM Plex Sans"/>
+              <a:sym typeface="IBM Plex Sans"/>
+            </a:endParaRPr>
+          </a:p>
+          <a:p>
+            <a:endParaRPr lang="en-US" sz="1399" spc="-16" dirty="0">
+              <a:solidFill>
+                <a:srgbClr val="3F3F3F"/>
+              </a:solidFill>
+              <a:latin typeface="IBM Plex Sans"/>
+              <a:sym typeface="IBM Plex Sans"/>
+            </a:endParaRPr>
+          </a:p>
+          <a:p>
+            <a:endParaRPr lang="en-US" sz="1399" spc="-16" dirty="0">
+              <a:solidFill>
+                <a:srgbClr val="3F3F3F"/>
+              </a:solidFill>
+              <a:effectLst/>
+              <a:latin typeface="IBM Plex Sans"/>
+              <a:sym typeface="IBM Plex Sans"/>
+            </a:endParaRPr>
+          </a:p>
+          <a:p>
+            <a:endParaRPr lang="en-US" sz="1400" dirty="0">
+              <a:solidFill>
+                <a:srgbClr val="000000"/>
+              </a:solidFill>
+              <a:effectLst/>
+              <a:latin typeface="Helvetica" pitchFamily="2" charset="0"/>
+            </a:endParaRPr>
+          </a:p>
+        </p:txBody>
+      </p:sp>
+      <p:sp>
+        <p:nvSpPr>
+          <p:cNvPr id="8" name="TextBox 8">
+            <a:extLst>
+              <a:ext uri="{FF2B5EF4-FFF2-40B4-BE49-F238E27FC236}">
+                <a16:creationId xmlns:a16="http://schemas.microsoft.com/office/drawing/2014/main" id="{831ED85F-D318-5079-C978-1092B49BAE01}"/>
+              </a:ext>
+            </a:extLst>
+          </p:cNvPr>
+          <p:cNvSpPr txBox="1"/>
+          <p:nvPr/>
+        </p:nvSpPr>
+        <p:spPr>
+          <a:xfrm>
+            <a:off x="85724" y="156629"/>
+            <a:ext cx="4257675" cy="605847"/>
+          </a:xfrm>
+          <a:prstGeom prst="rect">
+            <a:avLst/>
+          </a:prstGeom>
+        </p:spPr>
+        <p:txBody>
+          <a:bodyPr wrap="square" lIns="0" tIns="0" rIns="0" bIns="0" rtlCol="0" anchor="t">
+            <a:spAutoFit/>
+          </a:bodyPr>
+          <a:lstStyle/>
+          <a:p>
+            <a:pPr algn="l">
+              <a:lnSpc>
+                <a:spcPts val="5040"/>
+              </a:lnSpc>
+            </a:pPr>
+            <a:r>
+              <a:rPr lang="en-US" sz="3600" spc="-32" dirty="0">
+                <a:solidFill>
+                  <a:srgbClr val="262626"/>
+                </a:solidFill>
+                <a:latin typeface="Montserrat"/>
+                <a:ea typeface="Montserrat"/>
+                <a:cs typeface="Montserrat"/>
+                <a:sym typeface="Montserrat"/>
+              </a:rPr>
+              <a:t>Discussion</a:t>
+            </a:r>
+          </a:p>
+        </p:txBody>
+      </p:sp>
+    </p:spTree>
+    <p:extLst>
+      <p:ext uri="{BB962C8B-B14F-4D97-AF65-F5344CB8AC3E}">
+        <p14:creationId xmlns:p14="http://schemas.microsoft.com/office/powerpoint/2010/main" val="35901425"/>
+      </p:ext>
+    </p:extLst>
+  </p:cSld>
+  <p:clrMapOvr>
+    <a:masterClrMapping/>
+  </p:clrMapOvr>
+</p:sld>
+</file>
+
 <file path=ppt/slides/slide3.xml><?xml version="1.0" encoding="utf-8"?>
 <p:sld xmlns:a="http://schemas.openxmlformats.org/drawingml/2006/main" xmlns:r="http://schemas.openxmlformats.org/officeDocument/2006/relationships" xmlns:p="http://schemas.openxmlformats.org/presentationml/2006/main">
   <p:cSld>
@@ -20277,7 +20802,7 @@
         <p:spPr>
           <a:xfrm>
             <a:off x="1937175" y="4629150"/>
-            <a:ext cx="6597225" cy="369332"/>
+            <a:ext cx="6597225" cy="276999"/>
           </a:xfrm>
           <a:prstGeom prst="rect">
             <a:avLst/>
@@ -20291,7 +20816,7 @@
           <a:lstStyle/>
           <a:p>
             <a:r>
-              <a:rPr lang="en-US" dirty="0"/>
+              <a:rPr lang="en-US" sz="1200" dirty="0"/>
               <a:t>We have clean dataset, no duplicates and no missing values</a:t>
             </a:r>
           </a:p>

</xml_diff>